<commit_message>
finishing touches to slide
</commit_message>
<xml_diff>
--- a/ppt/MichaelDart_T2A2_Slidedeck.pptx
+++ b/ppt/MichaelDart_T2A2_Slidedeck.pptx
@@ -174,7 +174,7 @@
           <a:noFill/>
           <a:extLst>
             <a:ext uri="{909E8E84-426E-40dd-AFC4-6F175D3DCCD1}">
-              <a14:hiddenFill xmlns="" xmlns:a14="http://schemas.microsoft.com/office/drawing/2010/main">
+              <a14:hiddenFill xmlns:a14="http://schemas.microsoft.com/office/drawing/2010/main" xmlns="">
                 <a:solidFill>
                   <a:srgbClr val="FFFFFF"/>
                 </a:solidFill>
@@ -234,7 +234,7 @@
             </a:ln>
             <a:extLst>
               <a:ext uri="{91240B29-F687-4f45-9708-019B960494DF}">
-                <a14:hiddenLine xmlns="" xmlns:a14="http://schemas.microsoft.com/office/drawing/2010/main" w="9525">
+                <a14:hiddenLine xmlns:a14="http://schemas.microsoft.com/office/drawing/2010/main" xmlns="" w="9525">
                   <a:solidFill>
                     <a:srgbClr val="000000"/>
                   </a:solidFill>
@@ -324,7 +324,7 @@
             </a:ln>
             <a:extLst>
               <a:ext uri="{91240B29-F687-4f45-9708-019B960494DF}">
-                <a14:hiddenLine xmlns="" xmlns:a14="http://schemas.microsoft.com/office/drawing/2010/main" w="9525">
+                <a14:hiddenLine xmlns:a14="http://schemas.microsoft.com/office/drawing/2010/main" xmlns="" w="9525">
                   <a:solidFill>
                     <a:srgbClr val="000000"/>
                   </a:solidFill>
@@ -414,7 +414,7 @@
             </a:ln>
             <a:extLst>
               <a:ext uri="{91240B29-F687-4f45-9708-019B960494DF}">
-                <a14:hiddenLine xmlns="" xmlns:a14="http://schemas.microsoft.com/office/drawing/2010/main" w="9525">
+                <a14:hiddenLine xmlns:a14="http://schemas.microsoft.com/office/drawing/2010/main" xmlns="" w="9525">
                   <a:solidFill>
                     <a:srgbClr val="000000"/>
                   </a:solidFill>
@@ -448,7 +448,7 @@
             </a:ln>
             <a:extLst>
               <a:ext uri="{91240B29-F687-4f45-9708-019B960494DF}">
-                <a14:hiddenLine xmlns="" xmlns:a14="http://schemas.microsoft.com/office/drawing/2010/main" w="9525">
+                <a14:hiddenLine xmlns:a14="http://schemas.microsoft.com/office/drawing/2010/main" xmlns="" w="9525">
                   <a:solidFill>
                     <a:srgbClr val="000000"/>
                   </a:solidFill>
@@ -538,7 +538,7 @@
             </a:ln>
             <a:extLst>
               <a:ext uri="{91240B29-F687-4f45-9708-019B960494DF}">
-                <a14:hiddenLine xmlns="" xmlns:a14="http://schemas.microsoft.com/office/drawing/2010/main" w="9525">
+                <a14:hiddenLine xmlns:a14="http://schemas.microsoft.com/office/drawing/2010/main" xmlns="" w="9525">
                   <a:solidFill>
                     <a:srgbClr val="000000"/>
                   </a:solidFill>
@@ -600,7 +600,7 @@
             </a:ln>
             <a:extLst>
               <a:ext uri="{91240B29-F687-4f45-9708-019B960494DF}">
-                <a14:hiddenLine xmlns="" xmlns:a14="http://schemas.microsoft.com/office/drawing/2010/main" w="9525">
+                <a14:hiddenLine xmlns:a14="http://schemas.microsoft.com/office/drawing/2010/main" xmlns="" w="9525">
                   <a:solidFill>
                     <a:srgbClr val="000000"/>
                   </a:solidFill>
@@ -662,7 +662,7 @@
             </a:ln>
             <a:extLst>
               <a:ext uri="{91240B29-F687-4f45-9708-019B960494DF}">
-                <a14:hiddenLine xmlns="" xmlns:a14="http://schemas.microsoft.com/office/drawing/2010/main" w="9525">
+                <a14:hiddenLine xmlns:a14="http://schemas.microsoft.com/office/drawing/2010/main" xmlns="" w="9525">
                   <a:solidFill>
                     <a:srgbClr val="000000"/>
                   </a:solidFill>
@@ -752,7 +752,7 @@
             </a:ln>
             <a:extLst>
               <a:ext uri="{91240B29-F687-4f45-9708-019B960494DF}">
-                <a14:hiddenLine xmlns="" xmlns:a14="http://schemas.microsoft.com/office/drawing/2010/main" w="9525">
+                <a14:hiddenLine xmlns:a14="http://schemas.microsoft.com/office/drawing/2010/main" xmlns="" w="9525">
                   <a:solidFill>
                     <a:srgbClr val="000000"/>
                   </a:solidFill>
@@ -814,7 +814,7 @@
             </a:ln>
             <a:extLst>
               <a:ext uri="{91240B29-F687-4f45-9708-019B960494DF}">
-                <a14:hiddenLine xmlns="" xmlns:a14="http://schemas.microsoft.com/office/drawing/2010/main" w="9525">
+                <a14:hiddenLine xmlns:a14="http://schemas.microsoft.com/office/drawing/2010/main" xmlns="" w="9525">
                   <a:solidFill>
                     <a:srgbClr val="000000"/>
                   </a:solidFill>
@@ -876,7 +876,7 @@
             </a:ln>
             <a:extLst>
               <a:ext uri="{91240B29-F687-4f45-9708-019B960494DF}">
-                <a14:hiddenLine xmlns="" xmlns:a14="http://schemas.microsoft.com/office/drawing/2010/main" w="9525">
+                <a14:hiddenLine xmlns:a14="http://schemas.microsoft.com/office/drawing/2010/main" xmlns="" w="9525">
                   <a:solidFill>
                     <a:srgbClr val="000000"/>
                   </a:solidFill>
@@ -966,7 +966,7 @@
             </a:ln>
             <a:extLst>
               <a:ext uri="{91240B29-F687-4f45-9708-019B960494DF}">
-                <a14:hiddenLine xmlns="" xmlns:a14="http://schemas.microsoft.com/office/drawing/2010/main" w="9525">
+                <a14:hiddenLine xmlns:a14="http://schemas.microsoft.com/office/drawing/2010/main" xmlns="" w="9525">
                   <a:solidFill>
                     <a:srgbClr val="000000"/>
                   </a:solidFill>
@@ -1056,7 +1056,7 @@
             </a:ln>
             <a:extLst>
               <a:ext uri="{91240B29-F687-4f45-9708-019B960494DF}">
-                <a14:hiddenLine xmlns="" xmlns:a14="http://schemas.microsoft.com/office/drawing/2010/main" w="9525">
+                <a14:hiddenLine xmlns:a14="http://schemas.microsoft.com/office/drawing/2010/main" xmlns="" w="9525">
                   <a:solidFill>
                     <a:srgbClr val="000000"/>
                   </a:solidFill>
@@ -1118,7 +1118,7 @@
             </a:ln>
             <a:extLst>
               <a:ext uri="{91240B29-F687-4f45-9708-019B960494DF}">
-                <a14:hiddenLine xmlns="" xmlns:a14="http://schemas.microsoft.com/office/drawing/2010/main" w="9525">
+                <a14:hiddenLine xmlns:a14="http://schemas.microsoft.com/office/drawing/2010/main" xmlns="" w="9525">
                   <a:solidFill>
                     <a:srgbClr val="000000"/>
                   </a:solidFill>
@@ -1228,7 +1228,7 @@
             </a:ln>
             <a:extLst>
               <a:ext uri="{91240B29-F687-4f45-9708-019B960494DF}">
-                <a14:hiddenLine xmlns="" xmlns:a14="http://schemas.microsoft.com/office/drawing/2010/main" w="9525">
+                <a14:hiddenLine xmlns:a14="http://schemas.microsoft.com/office/drawing/2010/main" xmlns="" w="9525">
                   <a:solidFill>
                     <a:srgbClr val="000000"/>
                   </a:solidFill>
@@ -1290,7 +1290,7 @@
             </a:ln>
             <a:extLst>
               <a:ext uri="{91240B29-F687-4f45-9708-019B960494DF}">
-                <a14:hiddenLine xmlns="" xmlns:a14="http://schemas.microsoft.com/office/drawing/2010/main" w="9525">
+                <a14:hiddenLine xmlns:a14="http://schemas.microsoft.com/office/drawing/2010/main" xmlns="" w="9525">
                   <a:solidFill>
                     <a:srgbClr val="000000"/>
                   </a:solidFill>
@@ -1380,7 +1380,7 @@
             </a:ln>
             <a:extLst>
               <a:ext uri="{91240B29-F687-4f45-9708-019B960494DF}">
-                <a14:hiddenLine xmlns="" xmlns:a14="http://schemas.microsoft.com/office/drawing/2010/main" w="9525">
+                <a14:hiddenLine xmlns:a14="http://schemas.microsoft.com/office/drawing/2010/main" xmlns="" w="9525">
                   <a:solidFill>
                     <a:srgbClr val="000000"/>
                   </a:solidFill>
@@ -1470,7 +1470,7 @@
             </a:ln>
             <a:extLst>
               <a:ext uri="{91240B29-F687-4f45-9708-019B960494DF}">
-                <a14:hiddenLine xmlns="" xmlns:a14="http://schemas.microsoft.com/office/drawing/2010/main" w="9525">
+                <a14:hiddenLine xmlns:a14="http://schemas.microsoft.com/office/drawing/2010/main" xmlns="" w="9525">
                   <a:solidFill>
                     <a:srgbClr val="000000"/>
                   </a:solidFill>
@@ -1532,7 +1532,7 @@
             </a:ln>
             <a:extLst>
               <a:ext uri="{91240B29-F687-4f45-9708-019B960494DF}">
-                <a14:hiddenLine xmlns="" xmlns:a14="http://schemas.microsoft.com/office/drawing/2010/main" w="9525">
+                <a14:hiddenLine xmlns:a14="http://schemas.microsoft.com/office/drawing/2010/main" xmlns="" w="9525">
                   <a:solidFill>
                     <a:srgbClr val="000000"/>
                   </a:solidFill>
@@ -1622,7 +1622,7 @@
             </a:ln>
             <a:extLst>
               <a:ext uri="{91240B29-F687-4f45-9708-019B960494DF}">
-                <a14:hiddenLine xmlns="" xmlns:a14="http://schemas.microsoft.com/office/drawing/2010/main" w="9525">
+                <a14:hiddenLine xmlns:a14="http://schemas.microsoft.com/office/drawing/2010/main" xmlns="" w="9525">
                   <a:solidFill>
                     <a:srgbClr val="000000"/>
                   </a:solidFill>
@@ -1712,7 +1712,7 @@
             </a:ln>
             <a:extLst>
               <a:ext uri="{91240B29-F687-4f45-9708-019B960494DF}">
-                <a14:hiddenLine xmlns="" xmlns:a14="http://schemas.microsoft.com/office/drawing/2010/main" w="9525">
+                <a14:hiddenLine xmlns:a14="http://schemas.microsoft.com/office/drawing/2010/main" xmlns="" w="9525">
                   <a:solidFill>
                     <a:srgbClr val="000000"/>
                   </a:solidFill>
@@ -1768,7 +1768,7 @@
             </a:ln>
             <a:extLst>
               <a:ext uri="{91240B29-F687-4f45-9708-019B960494DF}">
-                <a14:hiddenLine xmlns="" xmlns:a14="http://schemas.microsoft.com/office/drawing/2010/main" w="9525">
+                <a14:hiddenLine xmlns:a14="http://schemas.microsoft.com/office/drawing/2010/main" xmlns="" w="9525">
                   <a:solidFill>
                     <a:srgbClr val="000000"/>
                   </a:solidFill>
@@ -1858,7 +1858,7 @@
             </a:ln>
             <a:extLst>
               <a:ext uri="{91240B29-F687-4f45-9708-019B960494DF}">
-                <a14:hiddenLine xmlns="" xmlns:a14="http://schemas.microsoft.com/office/drawing/2010/main" w="9525">
+                <a14:hiddenLine xmlns:a14="http://schemas.microsoft.com/office/drawing/2010/main" xmlns="" w="9525">
                   <a:solidFill>
                     <a:srgbClr val="000000"/>
                   </a:solidFill>
@@ -1914,7 +1914,7 @@
             </a:ln>
             <a:extLst>
               <a:ext uri="{91240B29-F687-4f45-9708-019B960494DF}">
-                <a14:hiddenLine xmlns="" xmlns:a14="http://schemas.microsoft.com/office/drawing/2010/main" w="9525">
+                <a14:hiddenLine xmlns:a14="http://schemas.microsoft.com/office/drawing/2010/main" xmlns="" w="9525">
                   <a:solidFill>
                     <a:srgbClr val="000000"/>
                   </a:solidFill>
@@ -2004,7 +2004,7 @@
             </a:ln>
             <a:extLst>
               <a:ext uri="{91240B29-F687-4f45-9708-019B960494DF}">
-                <a14:hiddenLine xmlns="" xmlns:a14="http://schemas.microsoft.com/office/drawing/2010/main" w="9525">
+                <a14:hiddenLine xmlns:a14="http://schemas.microsoft.com/office/drawing/2010/main" xmlns="" w="9525">
                   <a:solidFill>
                     <a:srgbClr val="000000"/>
                   </a:solidFill>
@@ -2072,7 +2072,7 @@
             </a:ln>
             <a:extLst>
               <a:ext uri="{91240B29-F687-4f45-9708-019B960494DF}">
-                <a14:hiddenLine xmlns="" xmlns:a14="http://schemas.microsoft.com/office/drawing/2010/main" w="9525">
+                <a14:hiddenLine xmlns:a14="http://schemas.microsoft.com/office/drawing/2010/main" xmlns="" w="9525">
                   <a:solidFill>
                     <a:srgbClr val="000000"/>
                   </a:solidFill>
@@ -2162,7 +2162,7 @@
             </a:ln>
             <a:extLst>
               <a:ext uri="{91240B29-F687-4f45-9708-019B960494DF}">
-                <a14:hiddenLine xmlns="" xmlns:a14="http://schemas.microsoft.com/office/drawing/2010/main" w="9525">
+                <a14:hiddenLine xmlns:a14="http://schemas.microsoft.com/office/drawing/2010/main" xmlns="" w="9525">
                   <a:solidFill>
                     <a:srgbClr val="000000"/>
                   </a:solidFill>
@@ -2230,7 +2230,7 @@
             </a:ln>
             <a:extLst>
               <a:ext uri="{91240B29-F687-4f45-9708-019B960494DF}">
-                <a14:hiddenLine xmlns="" xmlns:a14="http://schemas.microsoft.com/office/drawing/2010/main" w="9525">
+                <a14:hiddenLine xmlns:a14="http://schemas.microsoft.com/office/drawing/2010/main" xmlns="" w="9525">
                   <a:solidFill>
                     <a:srgbClr val="000000"/>
                   </a:solidFill>
@@ -2320,7 +2320,7 @@
             </a:ln>
             <a:extLst>
               <a:ext uri="{91240B29-F687-4f45-9708-019B960494DF}">
-                <a14:hiddenLine xmlns="" xmlns:a14="http://schemas.microsoft.com/office/drawing/2010/main" w="9525">
+                <a14:hiddenLine xmlns:a14="http://schemas.microsoft.com/office/drawing/2010/main" xmlns="" w="9525">
                   <a:solidFill>
                     <a:srgbClr val="000000"/>
                   </a:solidFill>
@@ -2354,7 +2354,7 @@
             </a:ln>
             <a:extLst>
               <a:ext uri="{91240B29-F687-4f45-9708-019B960494DF}">
-                <a14:hiddenLine xmlns="" xmlns:a14="http://schemas.microsoft.com/office/drawing/2010/main" w="9525">
+                <a14:hiddenLine xmlns:a14="http://schemas.microsoft.com/office/drawing/2010/main" xmlns="" w="9525">
                   <a:solidFill>
                     <a:srgbClr val="000000"/>
                   </a:solidFill>
@@ -2444,7 +2444,7 @@
             </a:ln>
             <a:extLst>
               <a:ext uri="{91240B29-F687-4f45-9708-019B960494DF}">
-                <a14:hiddenLine xmlns="" xmlns:a14="http://schemas.microsoft.com/office/drawing/2010/main" w="9525">
+                <a14:hiddenLine xmlns:a14="http://schemas.microsoft.com/office/drawing/2010/main" xmlns="" w="9525">
                   <a:solidFill>
                     <a:srgbClr val="000000"/>
                   </a:solidFill>
@@ -2506,7 +2506,7 @@
             </a:ln>
             <a:extLst>
               <a:ext uri="{91240B29-F687-4f45-9708-019B960494DF}">
-                <a14:hiddenLine xmlns="" xmlns:a14="http://schemas.microsoft.com/office/drawing/2010/main" w="9525">
+                <a14:hiddenLine xmlns:a14="http://schemas.microsoft.com/office/drawing/2010/main" xmlns="" w="9525">
                   <a:solidFill>
                     <a:srgbClr val="000000"/>
                   </a:solidFill>
@@ -2568,7 +2568,7 @@
             </a:ln>
             <a:extLst>
               <a:ext uri="{91240B29-F687-4f45-9708-019B960494DF}">
-                <a14:hiddenLine xmlns="" xmlns:a14="http://schemas.microsoft.com/office/drawing/2010/main" w="9525">
+                <a14:hiddenLine xmlns:a14="http://schemas.microsoft.com/office/drawing/2010/main" xmlns="" w="9525">
                   <a:solidFill>
                     <a:srgbClr val="000000"/>
                   </a:solidFill>
@@ -2658,7 +2658,7 @@
             </a:ln>
             <a:extLst>
               <a:ext uri="{91240B29-F687-4f45-9708-019B960494DF}">
-                <a14:hiddenLine xmlns="" xmlns:a14="http://schemas.microsoft.com/office/drawing/2010/main" w="9525">
+                <a14:hiddenLine xmlns:a14="http://schemas.microsoft.com/office/drawing/2010/main" xmlns="" w="9525">
                   <a:solidFill>
                     <a:srgbClr val="000000"/>
                   </a:solidFill>
@@ -2726,7 +2726,7 @@
             </a:ln>
             <a:extLst>
               <a:ext uri="{91240B29-F687-4f45-9708-019B960494DF}">
-                <a14:hiddenLine xmlns="" xmlns:a14="http://schemas.microsoft.com/office/drawing/2010/main" w="9525">
+                <a14:hiddenLine xmlns:a14="http://schemas.microsoft.com/office/drawing/2010/main" xmlns="" w="9525">
                   <a:solidFill>
                     <a:srgbClr val="000000"/>
                   </a:solidFill>
@@ -2788,7 +2788,7 @@
             </a:ln>
             <a:extLst>
               <a:ext uri="{91240B29-F687-4f45-9708-019B960494DF}">
-                <a14:hiddenLine xmlns="" xmlns:a14="http://schemas.microsoft.com/office/drawing/2010/main" w="9525">
+                <a14:hiddenLine xmlns:a14="http://schemas.microsoft.com/office/drawing/2010/main" xmlns="" w="9525">
                   <a:solidFill>
                     <a:srgbClr val="000000"/>
                   </a:solidFill>
@@ -2878,7 +2878,7 @@
             </a:ln>
             <a:extLst>
               <a:ext uri="{91240B29-F687-4f45-9708-019B960494DF}">
-                <a14:hiddenLine xmlns="" xmlns:a14="http://schemas.microsoft.com/office/drawing/2010/main" w="9525">
+                <a14:hiddenLine xmlns:a14="http://schemas.microsoft.com/office/drawing/2010/main" xmlns="" w="9525">
                   <a:solidFill>
                     <a:srgbClr val="000000"/>
                   </a:solidFill>
@@ -2940,7 +2940,7 @@
             </a:ln>
             <a:extLst>
               <a:ext uri="{91240B29-F687-4f45-9708-019B960494DF}">
-                <a14:hiddenLine xmlns="" xmlns:a14="http://schemas.microsoft.com/office/drawing/2010/main" w="9525">
+                <a14:hiddenLine xmlns:a14="http://schemas.microsoft.com/office/drawing/2010/main" xmlns="" w="9525">
                   <a:solidFill>
                     <a:srgbClr val="000000"/>
                   </a:solidFill>
@@ -3030,7 +3030,7 @@
             </a:ln>
             <a:extLst>
               <a:ext uri="{91240B29-F687-4f45-9708-019B960494DF}">
-                <a14:hiddenLine xmlns="" xmlns:a14="http://schemas.microsoft.com/office/drawing/2010/main" w="9525">
+                <a14:hiddenLine xmlns:a14="http://schemas.microsoft.com/office/drawing/2010/main" xmlns="" w="9525">
                   <a:solidFill>
                     <a:srgbClr val="000000"/>
                   </a:solidFill>
@@ -3092,7 +3092,7 @@
             </a:ln>
             <a:extLst>
               <a:ext uri="{91240B29-F687-4f45-9708-019B960494DF}">
-                <a14:hiddenLine xmlns="" xmlns:a14="http://schemas.microsoft.com/office/drawing/2010/main" w="9525">
+                <a14:hiddenLine xmlns:a14="http://schemas.microsoft.com/office/drawing/2010/main" xmlns="" w="9525">
                   <a:solidFill>
                     <a:srgbClr val="000000"/>
                   </a:solidFill>
@@ -3182,7 +3182,7 @@
             </a:ln>
             <a:extLst>
               <a:ext uri="{91240B29-F687-4f45-9708-019B960494DF}">
-                <a14:hiddenLine xmlns="" xmlns:a14="http://schemas.microsoft.com/office/drawing/2010/main" w="9525">
+                <a14:hiddenLine xmlns:a14="http://schemas.microsoft.com/office/drawing/2010/main" xmlns="" w="9525">
                   <a:solidFill>
                     <a:srgbClr val="000000"/>
                   </a:solidFill>
@@ -3216,7 +3216,7 @@
             </a:ln>
             <a:extLst>
               <a:ext uri="{91240B29-F687-4f45-9708-019B960494DF}">
-                <a14:hiddenLine xmlns="" xmlns:a14="http://schemas.microsoft.com/office/drawing/2010/main" w="9525">
+                <a14:hiddenLine xmlns:a14="http://schemas.microsoft.com/office/drawing/2010/main" xmlns="" w="9525">
                   <a:solidFill>
                     <a:srgbClr val="000000"/>
                   </a:solidFill>
@@ -3281,7 +3281,7 @@
             </a:ln>
             <a:extLst>
               <a:ext uri="{91240B29-F687-4f45-9708-019B960494DF}">
-                <a14:hiddenLine xmlns="" xmlns:a14="http://schemas.microsoft.com/office/drawing/2010/main" w="9525">
+                <a14:hiddenLine xmlns:a14="http://schemas.microsoft.com/office/drawing/2010/main" xmlns="" w="9525">
                   <a:solidFill>
                     <a:srgbClr val="000000"/>
                   </a:solidFill>
@@ -3371,7 +3371,7 @@
             </a:ln>
             <a:extLst>
               <a:ext uri="{91240B29-F687-4f45-9708-019B960494DF}">
-                <a14:hiddenLine xmlns="" xmlns:a14="http://schemas.microsoft.com/office/drawing/2010/main" w="9525">
+                <a14:hiddenLine xmlns:a14="http://schemas.microsoft.com/office/drawing/2010/main" xmlns="" w="9525">
                   <a:solidFill>
                     <a:srgbClr val="000000"/>
                   </a:solidFill>
@@ -3433,7 +3433,7 @@
             </a:ln>
             <a:extLst>
               <a:ext uri="{91240B29-F687-4f45-9708-019B960494DF}">
-                <a14:hiddenLine xmlns="" xmlns:a14="http://schemas.microsoft.com/office/drawing/2010/main" w="9525">
+                <a14:hiddenLine xmlns:a14="http://schemas.microsoft.com/office/drawing/2010/main" xmlns="" w="9525">
                   <a:solidFill>
                     <a:srgbClr val="000000"/>
                   </a:solidFill>
@@ -3523,7 +3523,7 @@
             </a:ln>
             <a:extLst>
               <a:ext uri="{91240B29-F687-4f45-9708-019B960494DF}">
-                <a14:hiddenLine xmlns="" xmlns:a14="http://schemas.microsoft.com/office/drawing/2010/main" w="9525">
+                <a14:hiddenLine xmlns:a14="http://schemas.microsoft.com/office/drawing/2010/main" xmlns="" w="9525">
                   <a:solidFill>
                     <a:srgbClr val="000000"/>
                   </a:solidFill>
@@ -3613,7 +3613,7 @@
             </a:ln>
             <a:extLst>
               <a:ext uri="{91240B29-F687-4f45-9708-019B960494DF}">
-                <a14:hiddenLine xmlns="" xmlns:a14="http://schemas.microsoft.com/office/drawing/2010/main" w="9525">
+                <a14:hiddenLine xmlns:a14="http://schemas.microsoft.com/office/drawing/2010/main" xmlns="" w="9525">
                   <a:solidFill>
                     <a:srgbClr val="000000"/>
                   </a:solidFill>
@@ -3678,7 +3678,7 @@
             </a:ln>
             <a:extLst>
               <a:ext uri="{91240B29-F687-4f45-9708-019B960494DF}">
-                <a14:hiddenLine xmlns="" xmlns:a14="http://schemas.microsoft.com/office/drawing/2010/main" w="9525">
+                <a14:hiddenLine xmlns:a14="http://schemas.microsoft.com/office/drawing/2010/main" xmlns="" w="9525">
                   <a:solidFill>
                     <a:srgbClr val="000000"/>
                   </a:solidFill>
@@ -3740,7 +3740,7 @@
             </a:ln>
             <a:extLst>
               <a:ext uri="{91240B29-F687-4f45-9708-019B960494DF}">
-                <a14:hiddenLine xmlns="" xmlns:a14="http://schemas.microsoft.com/office/drawing/2010/main" w="9525">
+                <a14:hiddenLine xmlns:a14="http://schemas.microsoft.com/office/drawing/2010/main" xmlns="" w="9525">
                   <a:solidFill>
                     <a:srgbClr val="000000"/>
                   </a:solidFill>
@@ -3830,7 +3830,7 @@
             </a:ln>
             <a:extLst>
               <a:ext uri="{91240B29-F687-4f45-9708-019B960494DF}">
-                <a14:hiddenLine xmlns="" xmlns:a14="http://schemas.microsoft.com/office/drawing/2010/main" w="9525">
+                <a14:hiddenLine xmlns:a14="http://schemas.microsoft.com/office/drawing/2010/main" xmlns="" w="9525">
                   <a:solidFill>
                     <a:srgbClr val="000000"/>
                   </a:solidFill>
@@ -3920,7 +3920,7 @@
             </a:ln>
             <a:extLst>
               <a:ext uri="{91240B29-F687-4f45-9708-019B960494DF}">
-                <a14:hiddenLine xmlns="" xmlns:a14="http://schemas.microsoft.com/office/drawing/2010/main" w="9525">
+                <a14:hiddenLine xmlns:a14="http://schemas.microsoft.com/office/drawing/2010/main" xmlns="" w="9525">
                   <a:solidFill>
                     <a:srgbClr val="000000"/>
                   </a:solidFill>
@@ -3982,7 +3982,7 @@
             </a:ln>
             <a:extLst>
               <a:ext uri="{91240B29-F687-4f45-9708-019B960494DF}">
-                <a14:hiddenLine xmlns="" xmlns:a14="http://schemas.microsoft.com/office/drawing/2010/main" w="9525">
+                <a14:hiddenLine xmlns:a14="http://schemas.microsoft.com/office/drawing/2010/main" xmlns="" w="9525">
                   <a:solidFill>
                     <a:srgbClr val="000000"/>
                   </a:solidFill>
@@ -4102,7 +4102,7 @@
             </a:ln>
             <a:extLst>
               <a:ext uri="{91240B29-F687-4f45-9708-019B960494DF}">
-                <a14:hiddenLine xmlns="" xmlns:a14="http://schemas.microsoft.com/office/drawing/2010/main" w="9525">
+                <a14:hiddenLine xmlns:a14="http://schemas.microsoft.com/office/drawing/2010/main" xmlns="" w="9525">
                   <a:solidFill>
                     <a:srgbClr val="000000"/>
                   </a:solidFill>
@@ -4170,7 +4170,7 @@
             </a:ln>
             <a:extLst>
               <a:ext uri="{91240B29-F687-4f45-9708-019B960494DF}">
-                <a14:hiddenLine xmlns="" xmlns:a14="http://schemas.microsoft.com/office/drawing/2010/main" w="9525">
+                <a14:hiddenLine xmlns:a14="http://schemas.microsoft.com/office/drawing/2010/main" xmlns="" w="9525">
                   <a:solidFill>
                     <a:srgbClr val="000000"/>
                   </a:solidFill>
@@ -4260,7 +4260,7 @@
             </a:ln>
             <a:extLst>
               <a:ext uri="{91240B29-F687-4f45-9708-019B960494DF}">
-                <a14:hiddenLine xmlns="" xmlns:a14="http://schemas.microsoft.com/office/drawing/2010/main" w="9525">
+                <a14:hiddenLine xmlns:a14="http://schemas.microsoft.com/office/drawing/2010/main" xmlns="" w="9525">
                   <a:solidFill>
                     <a:srgbClr val="000000"/>
                   </a:solidFill>
@@ -8982,7 +8982,7 @@
           <a:noFill/>
           <a:extLst>
             <a:ext uri="{909E8E84-426E-40dd-AFC4-6F175D3DCCD1}">
-              <a14:hiddenFill xmlns="" xmlns:a14="http://schemas.microsoft.com/office/drawing/2010/main">
+              <a14:hiddenFill xmlns:a14="http://schemas.microsoft.com/office/drawing/2010/main" xmlns="">
                 <a:solidFill>
                   <a:srgbClr val="FFFFFF"/>
                 </a:solidFill>
@@ -9056,7 +9056,7 @@
               </a:ln>
               <a:extLst>
                 <a:ext uri="{91240B29-F687-4f45-9708-019B960494DF}">
-                  <a14:hiddenLine xmlns="" xmlns:a14="http://schemas.microsoft.com/office/drawing/2010/main" w="9525">
+                  <a14:hiddenLine xmlns:a14="http://schemas.microsoft.com/office/drawing/2010/main" xmlns="" w="9525">
                     <a:solidFill>
                       <a:srgbClr val="000000"/>
                     </a:solidFill>
@@ -9146,7 +9146,7 @@
               </a:ln>
               <a:extLst>
                 <a:ext uri="{91240B29-F687-4f45-9708-019B960494DF}">
-                  <a14:hiddenLine xmlns="" xmlns:a14="http://schemas.microsoft.com/office/drawing/2010/main" w="9525">
+                  <a14:hiddenLine xmlns:a14="http://schemas.microsoft.com/office/drawing/2010/main" xmlns="" w="9525">
                     <a:solidFill>
                       <a:srgbClr val="000000"/>
                     </a:solidFill>
@@ -9236,7 +9236,7 @@
               </a:ln>
               <a:extLst>
                 <a:ext uri="{91240B29-F687-4f45-9708-019B960494DF}">
-                  <a14:hiddenLine xmlns="" xmlns:a14="http://schemas.microsoft.com/office/drawing/2010/main" w="9525">
+                  <a14:hiddenLine xmlns:a14="http://schemas.microsoft.com/office/drawing/2010/main" xmlns="" w="9525">
                     <a:solidFill>
                       <a:srgbClr val="000000"/>
                     </a:solidFill>
@@ -9298,7 +9298,7 @@
               </a:ln>
               <a:extLst>
                 <a:ext uri="{91240B29-F687-4f45-9708-019B960494DF}">
-                  <a14:hiddenLine xmlns="" xmlns:a14="http://schemas.microsoft.com/office/drawing/2010/main" w="9525">
+                  <a14:hiddenLine xmlns:a14="http://schemas.microsoft.com/office/drawing/2010/main" xmlns="" w="9525">
                     <a:solidFill>
                       <a:srgbClr val="000000"/>
                     </a:solidFill>
@@ -9388,7 +9388,7 @@
               </a:ln>
               <a:extLst>
                 <a:ext uri="{91240B29-F687-4f45-9708-019B960494DF}">
-                  <a14:hiddenLine xmlns="" xmlns:a14="http://schemas.microsoft.com/office/drawing/2010/main" w="9525">
+                  <a14:hiddenLine xmlns:a14="http://schemas.microsoft.com/office/drawing/2010/main" xmlns="" w="9525">
                     <a:solidFill>
                       <a:srgbClr val="000000"/>
                     </a:solidFill>
@@ -9450,7 +9450,7 @@
               </a:ln>
               <a:extLst>
                 <a:ext uri="{91240B29-F687-4f45-9708-019B960494DF}">
-                  <a14:hiddenLine xmlns="" xmlns:a14="http://schemas.microsoft.com/office/drawing/2010/main" w="9525">
+                  <a14:hiddenLine xmlns:a14="http://schemas.microsoft.com/office/drawing/2010/main" xmlns="" w="9525">
                     <a:solidFill>
                       <a:srgbClr val="000000"/>
                     </a:solidFill>
@@ -9512,7 +9512,7 @@
               </a:ln>
               <a:extLst>
                 <a:ext uri="{91240B29-F687-4f45-9708-019B960494DF}">
-                  <a14:hiddenLine xmlns="" xmlns:a14="http://schemas.microsoft.com/office/drawing/2010/main" w="9525">
+                  <a14:hiddenLine xmlns:a14="http://schemas.microsoft.com/office/drawing/2010/main" xmlns="" w="9525">
                     <a:solidFill>
                       <a:srgbClr val="000000"/>
                     </a:solidFill>
@@ -9602,7 +9602,7 @@
               </a:ln>
               <a:extLst>
                 <a:ext uri="{91240B29-F687-4f45-9708-019B960494DF}">
-                  <a14:hiddenLine xmlns="" xmlns:a14="http://schemas.microsoft.com/office/drawing/2010/main" w="9525">
+                  <a14:hiddenLine xmlns:a14="http://schemas.microsoft.com/office/drawing/2010/main" xmlns="" w="9525">
                     <a:solidFill>
                       <a:srgbClr val="000000"/>
                     </a:solidFill>
@@ -9692,7 +9692,7 @@
               </a:ln>
               <a:extLst>
                 <a:ext uri="{91240B29-F687-4f45-9708-019B960494DF}">
-                  <a14:hiddenLine xmlns="" xmlns:a14="http://schemas.microsoft.com/office/drawing/2010/main" w="9525">
+                  <a14:hiddenLine xmlns:a14="http://schemas.microsoft.com/office/drawing/2010/main" xmlns="" w="9525">
                     <a:solidFill>
                       <a:srgbClr val="000000"/>
                     </a:solidFill>
@@ -9754,7 +9754,7 @@
               </a:ln>
               <a:extLst>
                 <a:ext uri="{91240B29-F687-4f45-9708-019B960494DF}">
-                  <a14:hiddenLine xmlns="" xmlns:a14="http://schemas.microsoft.com/office/drawing/2010/main" w="9525">
+                  <a14:hiddenLine xmlns:a14="http://schemas.microsoft.com/office/drawing/2010/main" xmlns="" w="9525">
                     <a:solidFill>
                       <a:srgbClr val="000000"/>
                     </a:solidFill>
@@ -9864,7 +9864,7 @@
               </a:ln>
               <a:extLst>
                 <a:ext uri="{91240B29-F687-4f45-9708-019B960494DF}">
-                  <a14:hiddenLine xmlns="" xmlns:a14="http://schemas.microsoft.com/office/drawing/2010/main" w="9525">
+                  <a14:hiddenLine xmlns:a14="http://schemas.microsoft.com/office/drawing/2010/main" xmlns="" w="9525">
                     <a:solidFill>
                       <a:srgbClr val="000000"/>
                     </a:solidFill>
@@ -9948,7 +9948,7 @@
               </a:ln>
               <a:extLst>
                 <a:ext uri="{91240B29-F687-4f45-9708-019B960494DF}">
-                  <a14:hiddenLine xmlns="" xmlns:a14="http://schemas.microsoft.com/office/drawing/2010/main" w="9525">
+                  <a14:hiddenLine xmlns:a14="http://schemas.microsoft.com/office/drawing/2010/main" xmlns="" w="9525">
                     <a:solidFill>
                       <a:srgbClr val="000000"/>
                     </a:solidFill>
@@ -10010,7 +10010,7 @@
               </a:ln>
               <a:extLst>
                 <a:ext uri="{91240B29-F687-4f45-9708-019B960494DF}">
-                  <a14:hiddenLine xmlns="" xmlns:a14="http://schemas.microsoft.com/office/drawing/2010/main" w="9525">
+                  <a14:hiddenLine xmlns:a14="http://schemas.microsoft.com/office/drawing/2010/main" xmlns="" w="9525">
                     <a:solidFill>
                       <a:srgbClr val="000000"/>
                     </a:solidFill>
@@ -10072,7 +10072,7 @@
               </a:ln>
               <a:extLst>
                 <a:ext uri="{91240B29-F687-4f45-9708-019B960494DF}">
-                  <a14:hiddenLine xmlns="" xmlns:a14="http://schemas.microsoft.com/office/drawing/2010/main" w="9525">
+                  <a14:hiddenLine xmlns:a14="http://schemas.microsoft.com/office/drawing/2010/main" xmlns="" w="9525">
                     <a:solidFill>
                       <a:srgbClr val="000000"/>
                     </a:solidFill>
@@ -10162,7 +10162,7 @@
               </a:ln>
               <a:extLst>
                 <a:ext uri="{91240B29-F687-4f45-9708-019B960494DF}">
-                  <a14:hiddenLine xmlns="" xmlns:a14="http://schemas.microsoft.com/office/drawing/2010/main" w="9525">
+                  <a14:hiddenLine xmlns:a14="http://schemas.microsoft.com/office/drawing/2010/main" xmlns="" w="9525">
                     <a:solidFill>
                       <a:srgbClr val="000000"/>
                     </a:solidFill>
@@ -10196,7 +10196,7 @@
               </a:ln>
               <a:extLst>
                 <a:ext uri="{91240B29-F687-4f45-9708-019B960494DF}">
-                  <a14:hiddenLine xmlns="" xmlns:a14="http://schemas.microsoft.com/office/drawing/2010/main" w="9525">
+                  <a14:hiddenLine xmlns:a14="http://schemas.microsoft.com/office/drawing/2010/main" xmlns="" w="9525">
                     <a:solidFill>
                       <a:srgbClr val="000000"/>
                     </a:solidFill>
@@ -10261,7 +10261,7 @@
               </a:ln>
               <a:extLst>
                 <a:ext uri="{91240B29-F687-4f45-9708-019B960494DF}">
-                  <a14:hiddenLine xmlns="" xmlns:a14="http://schemas.microsoft.com/office/drawing/2010/main" w="9525">
+                  <a14:hiddenLine xmlns:a14="http://schemas.microsoft.com/office/drawing/2010/main" xmlns="" w="9525">
                     <a:solidFill>
                       <a:srgbClr val="000000"/>
                     </a:solidFill>
@@ -10351,7 +10351,7 @@
               </a:ln>
               <a:extLst>
                 <a:ext uri="{91240B29-F687-4f45-9708-019B960494DF}">
-                  <a14:hiddenLine xmlns="" xmlns:a14="http://schemas.microsoft.com/office/drawing/2010/main" w="9525">
+                  <a14:hiddenLine xmlns:a14="http://schemas.microsoft.com/office/drawing/2010/main" xmlns="" w="9525">
                     <a:solidFill>
                       <a:srgbClr val="000000"/>
                     </a:solidFill>
@@ -10413,7 +10413,7 @@
               </a:ln>
               <a:extLst>
                 <a:ext uri="{91240B29-F687-4f45-9708-019B960494DF}">
-                  <a14:hiddenLine xmlns="" xmlns:a14="http://schemas.microsoft.com/office/drawing/2010/main" w="9525">
+                  <a14:hiddenLine xmlns:a14="http://schemas.microsoft.com/office/drawing/2010/main" xmlns="" w="9525">
                     <a:solidFill>
                       <a:srgbClr val="000000"/>
                     </a:solidFill>
@@ -10503,7 +10503,7 @@
               </a:ln>
               <a:extLst>
                 <a:ext uri="{91240B29-F687-4f45-9708-019B960494DF}">
-                  <a14:hiddenLine xmlns="" xmlns:a14="http://schemas.microsoft.com/office/drawing/2010/main" w="9525">
+                  <a14:hiddenLine xmlns:a14="http://schemas.microsoft.com/office/drawing/2010/main" xmlns="" w="9525">
                     <a:solidFill>
                       <a:srgbClr val="000000"/>
                     </a:solidFill>
@@ -10568,7 +10568,7 @@
               </a:ln>
               <a:extLst>
                 <a:ext uri="{91240B29-F687-4f45-9708-019B960494DF}">
-                  <a14:hiddenLine xmlns="" xmlns:a14="http://schemas.microsoft.com/office/drawing/2010/main" w="9525">
+                  <a14:hiddenLine xmlns:a14="http://schemas.microsoft.com/office/drawing/2010/main" xmlns="" w="9525">
                     <a:solidFill>
                       <a:srgbClr val="000000"/>
                     </a:solidFill>
@@ -10630,7 +10630,7 @@
               </a:ln>
               <a:extLst>
                 <a:ext uri="{91240B29-F687-4f45-9708-019B960494DF}">
-                  <a14:hiddenLine xmlns="" xmlns:a14="http://schemas.microsoft.com/office/drawing/2010/main" w="9525">
+                  <a14:hiddenLine xmlns:a14="http://schemas.microsoft.com/office/drawing/2010/main" xmlns="" w="9525">
                     <a:solidFill>
                       <a:srgbClr val="000000"/>
                     </a:solidFill>
@@ -10720,7 +10720,7 @@
               </a:ln>
               <a:extLst>
                 <a:ext uri="{91240B29-F687-4f45-9708-019B960494DF}">
-                  <a14:hiddenLine xmlns="" xmlns:a14="http://schemas.microsoft.com/office/drawing/2010/main" w="9525">
+                  <a14:hiddenLine xmlns:a14="http://schemas.microsoft.com/office/drawing/2010/main" xmlns="" w="9525">
                     <a:solidFill>
                       <a:srgbClr val="000000"/>
                     </a:solidFill>
@@ -10810,7 +10810,7 @@
               </a:ln>
               <a:extLst>
                 <a:ext uri="{91240B29-F687-4f45-9708-019B960494DF}">
-                  <a14:hiddenLine xmlns="" xmlns:a14="http://schemas.microsoft.com/office/drawing/2010/main" w="9525">
+                  <a14:hiddenLine xmlns:a14="http://schemas.microsoft.com/office/drawing/2010/main" xmlns="" w="9525">
                     <a:solidFill>
                       <a:srgbClr val="000000"/>
                     </a:solidFill>
@@ -10875,7 +10875,7 @@
               </a:ln>
               <a:extLst>
                 <a:ext uri="{91240B29-F687-4f45-9708-019B960494DF}">
-                  <a14:hiddenLine xmlns="" xmlns:a14="http://schemas.microsoft.com/office/drawing/2010/main" w="9525">
+                  <a14:hiddenLine xmlns:a14="http://schemas.microsoft.com/office/drawing/2010/main" xmlns="" w="9525">
                     <a:solidFill>
                       <a:srgbClr val="000000"/>
                     </a:solidFill>
@@ -10995,7 +10995,7 @@
               </a:ln>
               <a:extLst>
                 <a:ext uri="{91240B29-F687-4f45-9708-019B960494DF}">
-                  <a14:hiddenLine xmlns="" xmlns:a14="http://schemas.microsoft.com/office/drawing/2010/main" w="9525">
+                  <a14:hiddenLine xmlns:a14="http://schemas.microsoft.com/office/drawing/2010/main" xmlns="" w="9525">
                     <a:solidFill>
                       <a:srgbClr val="000000"/>
                     </a:solidFill>
@@ -11093,7 +11093,7 @@
               </a:ln>
               <a:extLst>
                 <a:ext uri="{91240B29-F687-4f45-9708-019B960494DF}">
-                  <a14:hiddenLine xmlns="" xmlns:a14="http://schemas.microsoft.com/office/drawing/2010/main" w="9525">
+                  <a14:hiddenLine xmlns:a14="http://schemas.microsoft.com/office/drawing/2010/main" xmlns="" w="9525">
                     <a:solidFill>
                       <a:srgbClr val="000000"/>
                     </a:solidFill>
@@ -11208,7 +11208,7 @@
               </a:ln>
               <a:extLst>
                 <a:ext uri="{91240B29-F687-4f45-9708-019B960494DF}">
-                  <a14:hiddenLine xmlns="" xmlns:a14="http://schemas.microsoft.com/office/drawing/2010/main" w="9525">
+                  <a14:hiddenLine xmlns:a14="http://schemas.microsoft.com/office/drawing/2010/main" xmlns="" w="9525">
                     <a:solidFill>
                       <a:srgbClr val="000000"/>
                     </a:solidFill>
@@ -11298,7 +11298,7 @@
               </a:ln>
               <a:extLst>
                 <a:ext uri="{91240B29-F687-4f45-9708-019B960494DF}">
-                  <a14:hiddenLine xmlns="" xmlns:a14="http://schemas.microsoft.com/office/drawing/2010/main" w="9525">
+                  <a14:hiddenLine xmlns:a14="http://schemas.microsoft.com/office/drawing/2010/main" xmlns="" w="9525">
                     <a:solidFill>
                       <a:srgbClr val="000000"/>
                     </a:solidFill>
@@ -11363,7 +11363,7 @@
               </a:ln>
               <a:extLst>
                 <a:ext uri="{91240B29-F687-4f45-9708-019B960494DF}">
-                  <a14:hiddenLine xmlns="" xmlns:a14="http://schemas.microsoft.com/office/drawing/2010/main" w="9525">
+                  <a14:hiddenLine xmlns:a14="http://schemas.microsoft.com/office/drawing/2010/main" xmlns="" w="9525">
                     <a:solidFill>
                       <a:srgbClr val="000000"/>
                     </a:solidFill>
@@ -11453,7 +11453,7 @@
               </a:ln>
               <a:extLst>
                 <a:ext uri="{91240B29-F687-4f45-9708-019B960494DF}">
-                  <a14:hiddenLine xmlns="" xmlns:a14="http://schemas.microsoft.com/office/drawing/2010/main" w="9525">
+                  <a14:hiddenLine xmlns:a14="http://schemas.microsoft.com/office/drawing/2010/main" xmlns="" w="9525">
                     <a:solidFill>
                       <a:srgbClr val="000000"/>
                     </a:solidFill>
@@ -11521,7 +11521,7 @@
               </a:ln>
               <a:extLst>
                 <a:ext uri="{91240B29-F687-4f45-9708-019B960494DF}">
-                  <a14:hiddenLine xmlns="" xmlns:a14="http://schemas.microsoft.com/office/drawing/2010/main" w="9525">
+                  <a14:hiddenLine xmlns:a14="http://schemas.microsoft.com/office/drawing/2010/main" xmlns="" w="9525">
                     <a:solidFill>
                       <a:srgbClr val="000000"/>
                     </a:solidFill>
@@ -11611,7 +11611,7 @@
               </a:ln>
               <a:extLst>
                 <a:ext uri="{91240B29-F687-4f45-9708-019B960494DF}">
-                  <a14:hiddenLine xmlns="" xmlns:a14="http://schemas.microsoft.com/office/drawing/2010/main" w="9525">
+                  <a14:hiddenLine xmlns:a14="http://schemas.microsoft.com/office/drawing/2010/main" xmlns="" w="9525">
                     <a:solidFill>
                       <a:srgbClr val="000000"/>
                     </a:solidFill>
@@ -11679,7 +11679,7 @@
               </a:ln>
               <a:extLst>
                 <a:ext uri="{91240B29-F687-4f45-9708-019B960494DF}">
-                  <a14:hiddenLine xmlns="" xmlns:a14="http://schemas.microsoft.com/office/drawing/2010/main" w="9525">
+                  <a14:hiddenLine xmlns:a14="http://schemas.microsoft.com/office/drawing/2010/main" xmlns="" w="9525">
                     <a:solidFill>
                       <a:srgbClr val="000000"/>
                     </a:solidFill>
@@ -11769,7 +11769,7 @@
               </a:ln>
               <a:extLst>
                 <a:ext uri="{91240B29-F687-4f45-9708-019B960494DF}">
-                  <a14:hiddenLine xmlns="" xmlns:a14="http://schemas.microsoft.com/office/drawing/2010/main" w="9525">
+                  <a14:hiddenLine xmlns:a14="http://schemas.microsoft.com/office/drawing/2010/main" xmlns="" w="9525">
                     <a:solidFill>
                       <a:srgbClr val="000000"/>
                     </a:solidFill>
@@ -11803,7 +11803,7 @@
               </a:ln>
               <a:extLst>
                 <a:ext uri="{91240B29-F687-4f45-9708-019B960494DF}">
-                  <a14:hiddenLine xmlns="" xmlns:a14="http://schemas.microsoft.com/office/drawing/2010/main" w="9525">
+                  <a14:hiddenLine xmlns:a14="http://schemas.microsoft.com/office/drawing/2010/main" xmlns="" w="9525">
                     <a:solidFill>
                       <a:srgbClr val="000000"/>
                     </a:solidFill>
@@ -12651,7 +12651,7 @@
             <a:pPr algn="ctr"/>
             <a:r>
               <a:rPr lang="en-AU" sz="1200" dirty="0"/>
-              <a:t>Ability to add a product from the page</a:t>
+              <a:t>Ability to add a product from the buyers page</a:t>
             </a:r>
             <a:br>
               <a:rPr lang="en-AU" sz="1200" dirty="0"/>
@@ -13556,7 +13556,7 @@
         </p:nvSpPr>
         <p:spPr>
           <a:xfrm>
-            <a:off x="4509810" y="6140421"/>
+            <a:off x="4295996" y="6000500"/>
             <a:ext cx="3172379" cy="646331"/>
           </a:xfrm>
           <a:prstGeom prst="rect">
@@ -13596,8 +13596,8 @@
         </p:nvSpPr>
         <p:spPr>
           <a:xfrm>
-            <a:off x="1772263" y="4775062"/>
-            <a:ext cx="2490512" cy="840115"/>
+            <a:off x="1772262" y="4775062"/>
+            <a:ext cx="2864969" cy="830997"/>
           </a:xfrm>
           <a:prstGeom prst="rect">
             <a:avLst/>
@@ -13629,7 +13629,7 @@
             </a:r>
             <a:r>
               <a:rPr lang="en-AU" sz="1200" dirty="0"/>
-              <a:t> to confirm their order, which confirms to the user what they are purchasing</a:t>
+              <a:t> to confirm their order, which some details are displayed to the user, confirming their items for purchase</a:t>
             </a:r>
           </a:p>
         </p:txBody>
@@ -13690,7 +13690,7 @@
         <p:spPr>
           <a:xfrm>
             <a:off x="2438967" y="1085692"/>
-            <a:ext cx="2665034" cy="646331"/>
+            <a:ext cx="2665034" cy="830997"/>
           </a:xfrm>
           <a:prstGeom prst="rect">
             <a:avLst/>
@@ -13706,7 +13706,7 @@
             <a:pPr algn="ctr"/>
             <a:r>
               <a:rPr lang="en-AU" sz="1200" dirty="0"/>
-              <a:t>The user is then directed to Stripe via the API where the payment is processed, external to the application</a:t>
+              <a:t>The user is then directed to Stripe via the API where the payment is processed, external to the application and relieving it of any PCI responsibility</a:t>
             </a:r>
           </a:p>
         </p:txBody>
@@ -13728,8 +13728,8 @@
         </p:nvCxnSpPr>
         <p:spPr>
           <a:xfrm>
-            <a:off x="5104001" y="1408858"/>
-            <a:ext cx="1556371" cy="939085"/>
+            <a:off x="5104001" y="1501191"/>
+            <a:ext cx="1556371" cy="846752"/>
           </a:xfrm>
           <a:prstGeom prst="straightConnector1">
             <a:avLst/>
@@ -14332,7 +14332,7 @@
                   </a:schemeClr>
                 </a:solidFill>
               </a:rPr>
-              <a:t>Through the use of authentication and authorisation, the users trust that their information and products are secure and only able to be altered or removed if that user has the authorisation.</a:t>
+              <a:t>Through the use of authentication and authorisation, the users can trust that their information and products are secure and only able to be altered or removed if that user has the authorisation.</a:t>
             </a:r>
           </a:p>
         </p:txBody>
@@ -15052,8 +15052,8 @@
         </p:nvSpPr>
         <p:spPr>
           <a:xfrm>
-            <a:off x="5078561" y="764658"/>
-            <a:ext cx="2364257" cy="461669"/>
+            <a:off x="4766687" y="764658"/>
+            <a:ext cx="2676132" cy="461665"/>
           </a:xfrm>
           <a:prstGeom prst="rect">
             <a:avLst/>
@@ -15069,7 +15069,7 @@
             <a:pPr algn="ctr"/>
             <a:r>
               <a:rPr lang="en-AU" sz="1200" dirty="0"/>
-              <a:t>Ability for the User to Sign up with only a username and password</a:t>
+              <a:t>Ability for the User to Sign up with only a username and password needed</a:t>
             </a:r>
           </a:p>
         </p:txBody>
@@ -15091,8 +15091,8 @@
         </p:nvCxnSpPr>
         <p:spPr>
           <a:xfrm>
-            <a:off x="6260690" y="1226327"/>
-            <a:ext cx="34264" cy="292115"/>
+            <a:off x="6104753" y="1226323"/>
+            <a:ext cx="190201" cy="292119"/>
           </a:xfrm>
           <a:prstGeom prst="straightConnector1">
             <a:avLst/>
@@ -15147,7 +15147,7 @@
             <a:pPr algn="ctr"/>
             <a:r>
               <a:rPr lang="en-AU" sz="1200" dirty="0"/>
-              <a:t>Forgot your password function</a:t>
+              <a:t>“Forgot your password” function</a:t>
             </a:r>
           </a:p>
         </p:txBody>
@@ -15543,7 +15543,7 @@
             <a:pPr algn="ctr"/>
             <a:r>
               <a:rPr lang="en-AU" sz="1200" dirty="0"/>
-              <a:t>Further messages provided thanks with the help of the third party provide - Devise</a:t>
+              <a:t>Further messages provided with the help of a third party tool - Devise</a:t>
             </a:r>
             <a:r>
               <a:rPr lang="en-AU" sz="1800" dirty="0"/>
@@ -15826,7 +15826,7 @@
             <a:pPr algn="ctr"/>
             <a:r>
               <a:rPr lang="en-AU" sz="1200" dirty="0"/>
-              <a:t>All users can access other areas</a:t>
+              <a:t>All users can access areas that are not sensitive</a:t>
             </a:r>
           </a:p>
         </p:txBody>
@@ -16265,8 +16265,8 @@
         </p:nvSpPr>
         <p:spPr>
           <a:xfrm>
-            <a:off x="8124886" y="994685"/>
-            <a:ext cx="2322872" cy="473615"/>
+            <a:off x="7692759" y="994685"/>
+            <a:ext cx="2754999" cy="461665"/>
           </a:xfrm>
           <a:prstGeom prst="rect">
             <a:avLst/>
@@ -16282,7 +16282,7 @@
             <a:pPr algn="ctr"/>
             <a:r>
               <a:rPr lang="en-AU" sz="1200" dirty="0"/>
-              <a:t>To verify different authorisation, you can see it is a different user</a:t>
+              <a:t>To verify different authorisation abilities, you can see it is a different user</a:t>
             </a:r>
           </a:p>
         </p:txBody>
@@ -16304,8 +16304,8 @@
         </p:nvCxnSpPr>
         <p:spPr>
           <a:xfrm>
-            <a:off x="9286322" y="1468300"/>
-            <a:ext cx="966757" cy="614172"/>
+            <a:off x="9070259" y="1456350"/>
+            <a:ext cx="1182820" cy="626122"/>
           </a:xfrm>
           <a:prstGeom prst="straightConnector1">
             <a:avLst/>
@@ -16519,8 +16519,8 @@
         </p:nvSpPr>
         <p:spPr>
           <a:xfrm>
-            <a:off x="7900711" y="956812"/>
-            <a:ext cx="1856822" cy="461665"/>
+            <a:off x="7627497" y="861986"/>
+            <a:ext cx="2606040" cy="646331"/>
           </a:xfrm>
           <a:prstGeom prst="rect">
             <a:avLst/>
@@ -16536,8 +16536,17 @@
             <a:pPr algn="ctr"/>
             <a:r>
               <a:rPr lang="en-AU" sz="1200" dirty="0"/>
-              <a:t>User’s can create a profile or a product to sell</a:t>
-            </a:r>
+              <a:t>User’s can create a profile or a product to sell, making use of the CRUD functionality, </a:t>
+            </a:r>
+            <a:r>
+              <a:rPr lang="en-AU" sz="1200" b="1" dirty="0">
+                <a:solidFill>
+                  <a:srgbClr val="FFC000"/>
+                </a:solidFill>
+              </a:rPr>
+              <a:t>CREATE</a:t>
+            </a:r>
+            <a:endParaRPr lang="en-AU" sz="1200" dirty="0"/>
           </a:p>
         </p:txBody>
       </p:sp>
@@ -16558,8 +16567,8 @@
         </p:nvCxnSpPr>
         <p:spPr>
           <a:xfrm flipH="1">
-            <a:off x="5568991" y="1187645"/>
-            <a:ext cx="2331720" cy="1343178"/>
+            <a:off x="5295777" y="1185152"/>
+            <a:ext cx="2331720" cy="1186389"/>
           </a:xfrm>
           <a:prstGeom prst="straightConnector1">
             <a:avLst/>
@@ -16624,14 +16633,15 @@
           </p:cNvPr>
           <p:cNvCxnSpPr>
             <a:cxnSpLocks/>
+            <a:stCxn id="7" idx="2"/>
             <a:endCxn id="10" idx="0"/>
           </p:cNvCxnSpPr>
           <p:nvPr/>
         </p:nvCxnSpPr>
         <p:spPr>
-          <a:xfrm>
-            <a:off x="8744809" y="1507638"/>
-            <a:ext cx="1" cy="2069773"/>
+          <a:xfrm flipH="1">
+            <a:off x="8744810" y="1508317"/>
+            <a:ext cx="185707" cy="2069094"/>
           </a:xfrm>
           <a:prstGeom prst="straightConnector1">
             <a:avLst/>
@@ -16669,8 +16679,8 @@
         </p:nvSpPr>
         <p:spPr>
           <a:xfrm>
-            <a:off x="2972905" y="4689757"/>
-            <a:ext cx="2322872" cy="646331"/>
+            <a:off x="2578018" y="4689757"/>
+            <a:ext cx="2717759" cy="646331"/>
           </a:xfrm>
           <a:prstGeom prst="rect">
             <a:avLst/>
@@ -16686,7 +16696,7 @@
             <a:pPr algn="ctr"/>
             <a:r>
               <a:rPr lang="en-AU" sz="1200" dirty="0"/>
-              <a:t>Images can be uploaded along with the product details and stored in cloud service provider</a:t>
+              <a:t>Images can be uploaded along with the product details and stored in the cloud using a third party service provider</a:t>
             </a:r>
           </a:p>
         </p:txBody>

</xml_diff>